<commit_message>
added 500k+ housing price states fig
</commit_message>
<xml_diff>
--- a/Panic At The Desktop Project 1-.pptx
+++ b/Panic At The Desktop Project 1-.pptx
@@ -225,7 +225,7 @@
           <a:p>
             <a:fld id="{4929A4FD-FAFB-4CDA-9DC5-D20CA18269A9}" type="datetimeFigureOut">
               <a:rPr lang="en-US" smtClean="0"/>
-              <a:t>1/12/2020</a:t>
+              <a:t>1/13/2020</a:t>
             </a:fld>
             <a:endParaRPr lang="en-US" dirty="0"/>
           </a:p>
@@ -402,7 +402,7 @@
           <a:p>
             <a:fld id="{CB91E35E-F34C-4F0E-B8A1-D9F5F49CB3AD}" type="datetimeFigureOut">
               <a:rPr lang="en-US" smtClean="0"/>
-              <a:t>1/12/2020</a:t>
+              <a:t>1/13/2020</a:t>
             </a:fld>
             <a:endParaRPr lang="en-US" dirty="0"/>
           </a:p>
@@ -1083,7 +1083,7 @@
             <a:fld id="{B61BEF0D-F0BB-DE4B-95CE-6DB70DBA9567}" type="datetimeFigureOut">
               <a:rPr lang="en-US" smtClean="0"/>
               <a:pPr/>
-              <a:t>1/12/2020</a:t>
+              <a:t>1/13/2020</a:t>
             </a:fld>
             <a:endParaRPr lang="en-US" dirty="0"/>
           </a:p>
@@ -1347,7 +1347,7 @@
             <a:fld id="{B61BEF0D-F0BB-DE4B-95CE-6DB70DBA9567}" type="datetimeFigureOut">
               <a:rPr lang="en-US" smtClean="0"/>
               <a:pPr/>
-              <a:t>1/12/2020</a:t>
+              <a:t>1/13/2020</a:t>
             </a:fld>
             <a:endParaRPr lang="en-US" dirty="0"/>
           </a:p>
@@ -1584,7 +1584,7 @@
             <a:fld id="{B61BEF0D-F0BB-DE4B-95CE-6DB70DBA9567}" type="datetimeFigureOut">
               <a:rPr lang="en-US" smtClean="0"/>
               <a:pPr/>
-              <a:t>1/12/2020</a:t>
+              <a:t>1/13/2020</a:t>
             </a:fld>
             <a:endParaRPr lang="en-US" dirty="0"/>
           </a:p>
@@ -1826,7 +1826,7 @@
             <a:fld id="{B61BEF0D-F0BB-DE4B-95CE-6DB70DBA9567}" type="datetimeFigureOut">
               <a:rPr lang="en-US" smtClean="0"/>
               <a:pPr/>
-              <a:t>1/12/2020</a:t>
+              <a:t>1/13/2020</a:t>
             </a:fld>
             <a:endParaRPr lang="en-US" dirty="0"/>
           </a:p>
@@ -2135,7 +2135,7 @@
             <a:fld id="{B61BEF0D-F0BB-DE4B-95CE-6DB70DBA9567}" type="datetimeFigureOut">
               <a:rPr lang="en-US" smtClean="0"/>
               <a:pPr/>
-              <a:t>1/12/2020</a:t>
+              <a:t>1/13/2020</a:t>
             </a:fld>
             <a:endParaRPr lang="en-US" dirty="0"/>
           </a:p>
@@ -2439,7 +2439,7 @@
             <a:fld id="{B61BEF0D-F0BB-DE4B-95CE-6DB70DBA9567}" type="datetimeFigureOut">
               <a:rPr lang="en-US" smtClean="0"/>
               <a:pPr/>
-              <a:t>1/12/2020</a:t>
+              <a:t>1/13/2020</a:t>
             </a:fld>
             <a:endParaRPr lang="en-US" dirty="0"/>
           </a:p>
@@ -2863,7 +2863,7 @@
             <a:fld id="{B61BEF0D-F0BB-DE4B-95CE-6DB70DBA9567}" type="datetimeFigureOut">
               <a:rPr lang="en-US" smtClean="0"/>
               <a:pPr/>
-              <a:t>1/12/2020</a:t>
+              <a:t>1/13/2020</a:t>
             </a:fld>
             <a:endParaRPr lang="en-US" dirty="0"/>
           </a:p>
@@ -2960,7 +2960,7 @@
             <a:fld id="{B61BEF0D-F0BB-DE4B-95CE-6DB70DBA9567}" type="datetimeFigureOut">
               <a:rPr lang="en-US" smtClean="0"/>
               <a:pPr/>
-              <a:t>1/12/2020</a:t>
+              <a:t>1/13/2020</a:t>
             </a:fld>
             <a:endParaRPr lang="en-US" dirty="0"/>
           </a:p>
@@ -3124,7 +3124,7 @@
             <a:fld id="{B61BEF0D-F0BB-DE4B-95CE-6DB70DBA9567}" type="datetimeFigureOut">
               <a:rPr lang="en-US" smtClean="0"/>
               <a:pPr/>
-              <a:t>1/12/2020</a:t>
+              <a:t>1/13/2020</a:t>
             </a:fld>
             <a:endParaRPr lang="en-US" dirty="0"/>
           </a:p>
@@ -3504,7 +3504,7 @@
             <a:fld id="{B61BEF0D-F0BB-DE4B-95CE-6DB70DBA9567}" type="datetimeFigureOut">
               <a:rPr lang="en-US" smtClean="0"/>
               <a:pPr/>
-              <a:t>1/12/2020</a:t>
+              <a:t>1/13/2020</a:t>
             </a:fld>
             <a:endParaRPr lang="en-US" dirty="0"/>
           </a:p>
@@ -3794,7 +3794,7 @@
             <a:fld id="{B61BEF0D-F0BB-DE4B-95CE-6DB70DBA9567}" type="datetimeFigureOut">
               <a:rPr lang="en-US" smtClean="0"/>
               <a:pPr/>
-              <a:t>1/12/2020</a:t>
+              <a:t>1/13/2020</a:t>
             </a:fld>
             <a:endParaRPr lang="en-US" dirty="0"/>
           </a:p>
@@ -4007,7 +4007,7 @@
             <a:fld id="{B61BEF0D-F0BB-DE4B-95CE-6DB70DBA9567}" type="datetimeFigureOut">
               <a:rPr lang="en-US" smtClean="0"/>
               <a:pPr/>
-              <a:t>1/12/2020</a:t>
+              <a:t>1/13/2020</a:t>
             </a:fld>
             <a:endParaRPr lang="en-US" dirty="0"/>
           </a:p>
@@ -6107,8 +6107,8 @@
         </p:nvSpPr>
         <p:spPr>
           <a:xfrm>
-            <a:off x="448640" y="2106202"/>
-            <a:ext cx="11162169" cy="2862322"/>
+            <a:off x="581193" y="4643919"/>
+            <a:ext cx="11162169" cy="2031325"/>
           </a:xfrm>
           <a:prstGeom prst="rect">
             <a:avLst/>
@@ -6121,33 +6121,6 @@
           </a:bodyPr>
           <a:lstStyle/>
           <a:p>
-            <a:endParaRPr lang="en-US" dirty="0"/>
-          </a:p>
-          <a:p>
-            <a:pPr marL="285750" indent="-285750">
-              <a:buFont typeface="Arial" panose="020B0604020202020204" pitchFamily="34" charset="0"/>
-              <a:buChar char="•"/>
-            </a:pPr>
-            <a:r>
-              <a:rPr lang="en-US" dirty="0"/>
-              <a:t>Insert Fig of “Rhode Island unemployment rate by year”</a:t>
-            </a:r>
-          </a:p>
-          <a:p>
-            <a:pPr marL="285750" indent="-285750">
-              <a:buFont typeface="Arial" panose="020B0604020202020204" pitchFamily="34" charset="0"/>
-              <a:buChar char="•"/>
-            </a:pPr>
-            <a:r>
-              <a:rPr lang="en-US" dirty="0"/>
-              <a:t>Insert Fig of “California unemployment rate by year”</a:t>
-            </a:r>
-          </a:p>
-          <a:p>
-            <a:pPr marL="285750" indent="-285750">
-              <a:buFont typeface="Arial" panose="020B0604020202020204" pitchFamily="34" charset="0"/>
-              <a:buChar char="•"/>
-            </a:pPr>
             <a:endParaRPr lang="en-US" dirty="0"/>
           </a:p>
           <a:p>
@@ -6211,8 +6184,38 @@
         </p:blipFill>
         <p:spPr>
           <a:xfrm>
-            <a:off x="7141551" y="2088222"/>
-            <a:ext cx="4469258" cy="2681555"/>
+            <a:off x="6698906" y="1841886"/>
+            <a:ext cx="4911903" cy="2947142"/>
+          </a:xfrm>
+          <a:prstGeom prst="rect">
+            <a:avLst/>
+          </a:prstGeom>
+        </p:spPr>
+      </p:pic>
+      <p:pic>
+        <p:nvPicPr>
+          <p:cNvPr id="4" name="Picture 3">
+            <a:extLst>
+              <a:ext uri="{FF2B5EF4-FFF2-40B4-BE49-F238E27FC236}">
+                <a16:creationId xmlns:a16="http://schemas.microsoft.com/office/drawing/2014/main" id="{8E251900-DAC9-4646-833C-5001E09099BD}"/>
+              </a:ext>
+            </a:extLst>
+          </p:cNvPr>
+          <p:cNvPicPr>
+            <a:picLocks noChangeAspect="1"/>
+          </p:cNvPicPr>
+          <p:nvPr/>
+        </p:nvPicPr>
+        <p:blipFill>
+          <a:blip r:embed="rId3"/>
+          <a:stretch>
+            <a:fillRect/>
+          </a:stretch>
+        </p:blipFill>
+        <p:spPr>
+          <a:xfrm>
+            <a:off x="581191" y="1822635"/>
+            <a:ext cx="4911903" cy="2947142"/>
           </a:xfrm>
           <a:prstGeom prst="rect">
             <a:avLst/>
@@ -7858,15 +7861,6 @@
 </file>
 
 <file path=customXml/item2.xml><?xml version="1.0" encoding="utf-8"?>
-<?mso-contentType ?>
-<FormTemplates xmlns="http://schemas.microsoft.com/sharepoint/v3/contenttype/forms">
-  <Display>DocumentLibraryForm</Display>
-  <Edit>DocumentLibraryForm</Edit>
-  <New>DocumentLibraryForm</New>
-</FormTemplates>
-</file>
-
-<file path=customXml/item3.xml><?xml version="1.0" encoding="utf-8"?>
 <ct:contentTypeSchema xmlns:ct="http://schemas.microsoft.com/office/2006/metadata/contentType" xmlns:ma="http://schemas.microsoft.com/office/2006/metadata/properties/metaAttributes" ct:_="" ma:_="" ma:contentTypeName="Document" ma:contentTypeID="0x01010079F111ED35F8CC479449609E8A0923A6" ma:contentTypeVersion="12" ma:contentTypeDescription="Create a new document." ma:contentTypeScope="" ma:versionID="b385d60f68dd989dca1fdc827799d853">
   <xsd:schema xmlns:xsd="http://www.w3.org/2001/XMLSchema" xmlns:xs="http://www.w3.org/2001/XMLSchema" xmlns:p="http://schemas.microsoft.com/office/2006/metadata/properties" xmlns:ns2="71af3243-3dd4-4a8d-8c0d-dd76da1f02a5" xmlns:ns3="16c05727-aa75-4e4a-9b5f-8a80a1165891" targetNamespace="http://schemas.microsoft.com/office/2006/metadata/properties" ma:root="true" ma:fieldsID="1911b479caf7b199da365455750e4572" ns2:_="" ns3:_="">
     <xsd:import namespace="71af3243-3dd4-4a8d-8c0d-dd76da1f02a5"/>
@@ -8087,6 +8081,15 @@
 </ct:contentTypeSchema>
 </file>
 
+<file path=customXml/item3.xml><?xml version="1.0" encoding="utf-8"?>
+<?mso-contentType ?>
+<FormTemplates xmlns="http://schemas.microsoft.com/sharepoint/v3/contenttype/forms">
+  <Display>DocumentLibraryForm</Display>
+  <Edit>DocumentLibraryForm</Edit>
+  <New>DocumentLibraryForm</New>
+</FormTemplates>
+</file>
+
 <file path=customXml/itemProps1.xml><?xml version="1.0" encoding="utf-8"?>
 <ds:datastoreItem xmlns:ds="http://schemas.openxmlformats.org/officeDocument/2006/customXml" ds:itemID="{FF5C8BF1-B0E4-49A1-808F-40F2AD30E743}">
   <ds:schemaRefs>
@@ -8098,14 +8101,6 @@
 </file>
 
 <file path=customXml/itemProps2.xml><?xml version="1.0" encoding="utf-8"?>
-<ds:datastoreItem xmlns:ds="http://schemas.openxmlformats.org/officeDocument/2006/customXml" ds:itemID="{E3FC8A1C-A436-42C0-AC33-FAFFFAF219BC}">
-  <ds:schemaRefs>
-    <ds:schemaRef ds:uri="http://schemas.microsoft.com/sharepoint/v3/contenttype/forms"/>
-  </ds:schemaRefs>
-</ds:datastoreItem>
-</file>
-
-<file path=customXml/itemProps3.xml><?xml version="1.0" encoding="utf-8"?>
 <ds:datastoreItem xmlns:ds="http://schemas.openxmlformats.org/officeDocument/2006/customXml" ds:itemID="{E3852F5D-AAE7-473B-9767-8875B60BC63B}">
   <ds:schemaRefs>
     <ds:schemaRef ds:uri="http://schemas.microsoft.com/office/2006/metadata/contentType"/>
@@ -8122,4 +8117,12 @@
     <ds:schemaRef ds:uri="http://schemas.microsoft.com/internal/obd"/>
   </ds:schemaRefs>
 </ds:datastoreItem>
+</file>
+
+<file path=customXml/itemProps3.xml><?xml version="1.0" encoding="utf-8"?>
+<ds:datastoreItem xmlns:ds="http://schemas.openxmlformats.org/officeDocument/2006/customXml" ds:itemID="{E3FC8A1C-A436-42C0-AC33-FAFFFAF219BC}">
+  <ds:schemaRefs>
+    <ds:schemaRef ds:uri="http://schemas.microsoft.com/sharepoint/v3/contenttype/forms"/>
+  </ds:schemaRefs>
+</ds:datastoreItem>
 </file>
</xml_diff>

<commit_message>
adding final ppt Shawn
</commit_message>
<xml_diff>
--- a/Panic At The Desktop Project 1-.pptx
+++ b/Panic At The Desktop Project 1-.pptx
@@ -5106,8 +5106,8 @@
         </p:nvSpPr>
         <p:spPr>
           <a:xfrm>
-            <a:off x="448640" y="2106202"/>
-            <a:ext cx="11162169" cy="1200329"/>
+            <a:off x="448640" y="2077326"/>
+            <a:ext cx="11162169" cy="2862322"/>
           </a:xfrm>
           <a:prstGeom prst="rect">
             <a:avLst/>
@@ -5129,7 +5129,57 @@
             </a:pPr>
             <a:r>
               <a:rPr lang="en-US" dirty="0"/>
-              <a:t>Size of the state doesn’t have a huge impact, CLF no impact, unemployment yes vs. housing price, birth rate no vs. unemployment</a:t>
+              <a:t>The size of the state population (CLF) doesn’t have a strong correlation with unemployment rates as compared to other states</a:t>
+            </a:r>
+          </a:p>
+          <a:p>
+            <a:pPr marL="285750" indent="-285750">
+              <a:buFont typeface="Arial" panose="020B0604020202020204" pitchFamily="34" charset="0"/>
+              <a:buChar char="•"/>
+            </a:pPr>
+            <a:r>
+              <a:rPr lang="en-US" dirty="0"/>
+              <a:t>The CLF of a state doesn’t influence what the median housing price is in that state</a:t>
+            </a:r>
+          </a:p>
+          <a:p>
+            <a:pPr marL="742950" lvl="1" indent="-285750">
+              <a:buFont typeface="Arial" panose="020B0604020202020204" pitchFamily="34" charset="0"/>
+              <a:buChar char="•"/>
+            </a:pPr>
+            <a:r>
+              <a:rPr lang="en-US" dirty="0"/>
+              <a:t>See Rhode Island vs. California</a:t>
+            </a:r>
+          </a:p>
+          <a:p>
+            <a:pPr marL="285750" indent="-285750">
+              <a:buFont typeface="Arial" panose="020B0604020202020204" pitchFamily="34" charset="0"/>
+              <a:buChar char="•"/>
+            </a:pPr>
+            <a:r>
+              <a:rPr lang="en-US" dirty="0"/>
+              <a:t>Unemployment rates and median housing prices have an inverse relationship</a:t>
+            </a:r>
+          </a:p>
+          <a:p>
+            <a:pPr marL="742950" lvl="1" indent="-285750">
+              <a:buFont typeface="Arial" panose="020B0604020202020204" pitchFamily="34" charset="0"/>
+              <a:buChar char="•"/>
+            </a:pPr>
+            <a:r>
+              <a:rPr lang="en-US" dirty="0"/>
+              <a:t>Housing prices increase as unemployment rates decrease, and vice versa</a:t>
+            </a:r>
+          </a:p>
+          <a:p>
+            <a:pPr marL="285750" indent="-285750">
+              <a:buFont typeface="Arial" panose="020B0604020202020204" pitchFamily="34" charset="0"/>
+              <a:buChar char="•"/>
+            </a:pPr>
+            <a:r>
+              <a:rPr lang="en-US" dirty="0"/>
+              <a:t>Despite unemployment rate decreasing significantly from 2010 to 2018, birth rate went down as well. The lowest birth rate in 2018 was in New Hampshire and Vermont, and the highest was in Utah and North Dakota.</a:t>
             </a:r>
           </a:p>
           <a:p>
@@ -5364,59 +5414,6 @@
               </a:rPr>
               <a:t>Thank You</a:t>
             </a:r>
-          </a:p>
-        </p:txBody>
-      </p:sp>
-      <p:sp>
-        <p:nvSpPr>
-          <p:cNvPr id="3" name="Subtitle 2">
-            <a:extLst>
-              <a:ext uri="{FF2B5EF4-FFF2-40B4-BE49-F238E27FC236}">
-                <a16:creationId xmlns:a16="http://schemas.microsoft.com/office/drawing/2014/main" id="{A9CB511D-EA45-4336-847C-1252667143B5}"/>
-              </a:ext>
-            </a:extLst>
-          </p:cNvPr>
-          <p:cNvSpPr>
-            <a:spLocks noGrp="1"/>
-          </p:cNvSpPr>
-          <p:nvPr>
-            <p:ph type="subTitle" idx="1"/>
-          </p:nvPr>
-        </p:nvSpPr>
-        <p:spPr>
-          <a:xfrm>
-            <a:off x="8296275" y="3505095"/>
-            <a:ext cx="3081576" cy="2629006"/>
-          </a:xfrm>
-        </p:spPr>
-        <p:txBody>
-          <a:bodyPr>
-            <a:normAutofit/>
-          </a:bodyPr>
-          <a:lstStyle/>
-          <a:p>
-            <a:r>
-              <a:rPr lang="en-US" dirty="0">
-                <a:solidFill>
-                  <a:schemeClr val="bg2"/>
-                </a:solidFill>
-              </a:rPr>
-              <a:t>someone@example.com</a:t>
-            </a:r>
-          </a:p>
-          <a:p>
-            <a:endParaRPr lang="en-US" dirty="0">
-              <a:solidFill>
-                <a:schemeClr val="bg2"/>
-              </a:solidFill>
-            </a:endParaRPr>
-          </a:p>
-          <a:p>
-            <a:endParaRPr lang="en-US" dirty="0">
-              <a:solidFill>
-                <a:schemeClr val="bg2"/>
-              </a:solidFill>
-            </a:endParaRPr>
           </a:p>
         </p:txBody>
       </p:sp>
@@ -5660,10 +5657,9 @@
           <a:lstStyle/>
           <a:p>
             <a:r>
-              <a:rPr lang="en-US" dirty="0" err="1"/>
-              <a:t>mETHODology</a:t>
-            </a:r>
-            <a:endParaRPr lang="en-US" dirty="0"/>
+              <a:rPr lang="en-US" dirty="0"/>
+              <a:t>methodology</a:t>
+            </a:r>
           </a:p>
         </p:txBody>
       </p:sp>
@@ -5681,8 +5677,8 @@
         </p:nvSpPr>
         <p:spPr>
           <a:xfrm>
-            <a:off x="448640" y="2106202"/>
-            <a:ext cx="11162169" cy="4370427"/>
+            <a:off x="514915" y="1827069"/>
+            <a:ext cx="11162169" cy="5293757"/>
           </a:xfrm>
           <a:prstGeom prst="rect">
             <a:avLst/>
@@ -5745,7 +5741,7 @@
             </a:pPr>
             <a:r>
               <a:rPr lang="en-US" sz="1600" b="1" dirty="0"/>
-              <a:t>What data did we use/how did we use it?</a:t>
+              <a:t>What data did we use/how did we clean it?</a:t>
             </a:r>
           </a:p>
           <a:p>
@@ -5755,7 +5751,7 @@
             </a:pPr>
             <a:r>
               <a:rPr lang="en-US" sz="1600" dirty="0"/>
-              <a:t> We used data from the …. , …., …., and …. that showed the civilian labor force (CLF), unemployment rates, birth rates, and median housing prices by state from 2007 to 2018</a:t>
+              <a:t>We used data from the USDA ERS and …. that showed the civilian labor force (CLF), unemployment rates, birth rates, and median housing prices by state from 2007 to 2018</a:t>
             </a:r>
           </a:p>
           <a:p>
@@ -5765,7 +5761,7 @@
             </a:pPr>
             <a:r>
               <a:rPr lang="en-US" sz="1600" dirty="0"/>
-              <a:t>We used the civilian labor force as the main group, and binned each state by it’s CLF count</a:t>
+              <a:t>Began with information of all states and counties (for all metrics listed above) and decided we didn’t need to use the county level data</a:t>
             </a:r>
           </a:p>
           <a:p>
@@ -5775,7 +5771,27 @@
             </a:pPr>
             <a:r>
               <a:rPr lang="en-US" sz="1600" dirty="0"/>
-              <a:t>The main bins for this presentation are states with over 5,000,000 CLF population and states with under 1,000,000 CLF population</a:t>
+              <a:t>Dropped columns these columns and renamed columns for easier readability and consumption</a:t>
+            </a:r>
+          </a:p>
+          <a:p>
+            <a:pPr marL="742950" lvl="1" indent="-285750">
+              <a:buFont typeface="Arial" panose="020B0604020202020204" pitchFamily="34" charset="0"/>
+              <a:buChar char="•"/>
+            </a:pPr>
+            <a:r>
+              <a:rPr lang="en-US" sz="1600" dirty="0"/>
+              <a:t>Created functions to change data from strings to floats and define different variables, such as state unemployment and state population</a:t>
+            </a:r>
+          </a:p>
+          <a:p>
+            <a:pPr marL="742950" lvl="1" indent="-285750">
+              <a:buFont typeface="Arial" panose="020B0604020202020204" pitchFamily="34" charset="0"/>
+              <a:buChar char="•"/>
+            </a:pPr>
+            <a:r>
+              <a:rPr lang="en-US" sz="1600" dirty="0"/>
+              <a:t>Merged the cleaned datasets together so all data could be compared </a:t>
             </a:r>
           </a:p>
           <a:p>
@@ -5795,7 +5811,7 @@
             </a:pPr>
             <a:r>
               <a:rPr lang="en-US" sz="1600" dirty="0"/>
-              <a:t>Began with information of all states and counties, needed to remove county level information</a:t>
+              <a:t>We used the civilian labor force as the main group, and binned each state by it’s CLF count</a:t>
             </a:r>
           </a:p>
           <a:p>
@@ -5805,7 +5821,7 @@
             </a:pPr>
             <a:r>
               <a:rPr lang="en-US" sz="1600" dirty="0"/>
-              <a:t>Renamed columns, dropped columns, merged datasets, changed all strings to floats so they could be graphed</a:t>
+              <a:t>The main bins for this presentation are states with over 5,000,000 CLF population and states with under 1,000,000 CLF population</a:t>
             </a:r>
           </a:p>
           <a:p>
@@ -5935,7 +5951,7 @@
             </a:pPr>
             <a:r>
               <a:rPr lang="en-US" dirty="0"/>
-              <a:t>Conclusions</a:t>
+              <a:t>Findings</a:t>
             </a:r>
           </a:p>
           <a:p>
@@ -5969,10 +5985,10 @@
       </p:sp>
       <p:pic>
         <p:nvPicPr>
-          <p:cNvPr id="4" name="Picture 3">
+          <p:cNvPr id="3" name="Picture 2">
             <a:extLst>
               <a:ext uri="{FF2B5EF4-FFF2-40B4-BE49-F238E27FC236}">
-                <a16:creationId xmlns:a16="http://schemas.microsoft.com/office/drawing/2014/main" id="{A17B27C5-FCAC-4CCD-AC62-669B4E20DC4A}"/>
+                <a16:creationId xmlns:a16="http://schemas.microsoft.com/office/drawing/2014/main" id="{F67C6D1D-6FB8-4FAA-8A0B-16B993EF8FB9}"/>
               </a:ext>
             </a:extLst>
           </p:cNvPr>
@@ -5989,8 +6005,8 @@
         </p:blipFill>
         <p:spPr>
           <a:xfrm>
-            <a:off x="6096001" y="2109425"/>
-            <a:ext cx="5254924" cy="2639149"/>
+            <a:off x="6096000" y="1890702"/>
+            <a:ext cx="5647360" cy="3249309"/>
           </a:xfrm>
           <a:prstGeom prst="rect">
             <a:avLst/>
@@ -5999,10 +6015,10 @@
       </p:pic>
       <p:pic>
         <p:nvPicPr>
-          <p:cNvPr id="6" name="Picture 5">
+          <p:cNvPr id="7" name="Picture 6">
             <a:extLst>
               <a:ext uri="{FF2B5EF4-FFF2-40B4-BE49-F238E27FC236}">
-                <a16:creationId xmlns:a16="http://schemas.microsoft.com/office/drawing/2014/main" id="{0477D509-6E68-462E-9AF0-33FA08000F13}"/>
+                <a16:creationId xmlns:a16="http://schemas.microsoft.com/office/drawing/2014/main" id="{1B6C82F4-40B8-4F00-A182-2AFEAFE9D149}"/>
               </a:ext>
             </a:extLst>
           </p:cNvPr>
@@ -6019,8 +6035,8 @@
         </p:blipFill>
         <p:spPr>
           <a:xfrm>
-            <a:off x="448640" y="2010287"/>
-            <a:ext cx="5576775" cy="2837426"/>
+            <a:off x="581191" y="1890702"/>
+            <a:ext cx="5726815" cy="3249309"/>
           </a:xfrm>
           <a:prstGeom prst="rect">
             <a:avLst/>
@@ -6080,15 +6096,7 @@
           <a:p>
             <a:r>
               <a:rPr lang="en-US" dirty="0"/>
-              <a:t>Part #1 – unemployment Rates vs. CLF </a:t>
-            </a:r>
-            <a:r>
-              <a:rPr lang="en-US" dirty="0" err="1"/>
-              <a:t>COntinued</a:t>
-            </a:r>
-            <a:r>
-              <a:rPr lang="en-US" dirty="0"/>
-              <a:t> </a:t>
+              <a:t>Part #1 – unemployment Rates vs. CLF Continued – Rhode Island vs. California </a:t>
             </a:r>
           </a:p>
         </p:txBody>
@@ -6107,8 +6115,8 @@
         </p:nvSpPr>
         <p:spPr>
           <a:xfrm>
-            <a:off x="581193" y="4643919"/>
-            <a:ext cx="11162169" cy="2031325"/>
+            <a:off x="514915" y="4912924"/>
+            <a:ext cx="11162169" cy="1754326"/>
           </a:xfrm>
           <a:prstGeom prst="rect">
             <a:avLst/>
@@ -6130,7 +6138,7 @@
             </a:pPr>
             <a:r>
               <a:rPr lang="en-US" dirty="0"/>
-              <a:t>Conclusions</a:t>
+              <a:t>Findings</a:t>
             </a:r>
           </a:p>
           <a:p>
@@ -6140,7 +6148,7 @@
             </a:pPr>
             <a:r>
               <a:rPr lang="en-US" dirty="0"/>
-              <a:t>The number of CLF has no impact on the general trend of decrease in unemployment. </a:t>
+              <a:t>Two specific examples of large vs. small CLF show almost an identical trend and regression line for unemployment by year</a:t>
             </a:r>
           </a:p>
           <a:p>
@@ -6150,7 +6158,7 @@
             </a:pPr>
             <a:r>
               <a:rPr lang="en-US" dirty="0"/>
-              <a:t>We can see that unemployment reaches its peak at every state in either 2009/2010. This peak remains here for every state regardless of the CLF population. Then after this peak, you can see a decreasing trend of unemployment in all states</a:t>
+              <a:t>We don’t believe there is any correlation between CLF and unemployment rate</a:t>
             </a:r>
           </a:p>
           <a:p>
@@ -6184,8 +6192,8 @@
         </p:blipFill>
         <p:spPr>
           <a:xfrm>
-            <a:off x="6698906" y="1841886"/>
-            <a:ext cx="4911903" cy="2947142"/>
+            <a:off x="6343048" y="1965782"/>
+            <a:ext cx="5334039" cy="2947142"/>
           </a:xfrm>
           <a:prstGeom prst="rect">
             <a:avLst/>
@@ -6214,8 +6222,8 @@
         </p:blipFill>
         <p:spPr>
           <a:xfrm>
-            <a:off x="581191" y="1822635"/>
-            <a:ext cx="4911903" cy="2947142"/>
+            <a:off x="514915" y="1965782"/>
+            <a:ext cx="5334038" cy="2947142"/>
           </a:xfrm>
           <a:prstGeom prst="rect">
             <a:avLst/>
@@ -6275,7 +6283,7 @@
           <a:p>
             <a:r>
               <a:rPr lang="en-US" dirty="0"/>
-              <a:t>Part #2 – Median House Price</a:t>
+              <a:t>Part #2 – Median House Price – Rhode Island vs. California</a:t>
             </a:r>
           </a:p>
         </p:txBody>
@@ -6294,8 +6302,8 @@
         </p:nvSpPr>
         <p:spPr>
           <a:xfrm>
-            <a:off x="448640" y="2106202"/>
-            <a:ext cx="11162169" cy="2031325"/>
+            <a:off x="581193" y="5103674"/>
+            <a:ext cx="11162169" cy="1477328"/>
           </a:xfrm>
           <a:prstGeom prst="rect">
             <a:avLst/>
@@ -6311,44 +6319,16 @@
             <a:endParaRPr lang="en-US" dirty="0"/>
           </a:p>
           <a:p>
+            <a:endParaRPr lang="en-US" dirty="0"/>
+          </a:p>
+          <a:p>
             <a:pPr marL="285750" indent="-285750">
               <a:buFont typeface="Arial" panose="020B0604020202020204" pitchFamily="34" charset="0"/>
               <a:buChar char="•"/>
             </a:pPr>
             <a:r>
               <a:rPr lang="en-US" dirty="0"/>
-              <a:t>Insert FIG of “House Price for states with price &gt; $500,000”</a:t>
-            </a:r>
-          </a:p>
-          <a:p>
-            <a:pPr marL="285750" indent="-285750">
-              <a:buFont typeface="Arial" panose="020B0604020202020204" pitchFamily="34" charset="0"/>
-              <a:buChar char="•"/>
-            </a:pPr>
-            <a:endParaRPr lang="en-US" dirty="0"/>
-          </a:p>
-          <a:p>
-            <a:pPr marL="285750" indent="-285750">
-              <a:buFont typeface="Arial" panose="020B0604020202020204" pitchFamily="34" charset="0"/>
-              <a:buChar char="•"/>
-            </a:pPr>
-            <a:r>
-              <a:rPr lang="en-US" dirty="0"/>
-              <a:t>Conclusions</a:t>
-            </a:r>
-          </a:p>
-          <a:p>
-            <a:pPr lvl="1"/>
-            <a:r>
-              <a:rPr lang="en-US" dirty="0"/>
-              <a:t>Rhode Island and California largest and smallest, but both in highest bin for home price</a:t>
-            </a:r>
-          </a:p>
-          <a:p>
-            <a:pPr lvl="1"/>
-            <a:r>
-              <a:rPr lang="en-US" dirty="0"/>
-              <a:t>CLF does not influence median housing price</a:t>
+              <a:t>Findings</a:t>
             </a:r>
           </a:p>
           <a:p>
@@ -6356,10 +6336,43 @@
               <a:buFont typeface="Arial" panose="020B0604020202020204" pitchFamily="34" charset="0"/>
               <a:buChar char="•"/>
             </a:pPr>
-            <a:endParaRPr lang="en-US" dirty="0"/>
-          </a:p>
-        </p:txBody>
-      </p:sp>
+            <a:r>
+              <a:rPr lang="en-US" dirty="0"/>
+              <a:t>Rhode Island and California are both in the highest median price bin, yet were in opposite CLF bins (under 1,000,000 vs. greater than 5,000,000)</a:t>
+            </a:r>
+          </a:p>
+        </p:txBody>
+      </p:sp>
+      <p:pic>
+        <p:nvPicPr>
+          <p:cNvPr id="6" name="Picture 5">
+            <a:extLst>
+              <a:ext uri="{FF2B5EF4-FFF2-40B4-BE49-F238E27FC236}">
+                <a16:creationId xmlns:a16="http://schemas.microsoft.com/office/drawing/2014/main" id="{DFE3325E-6DF8-4512-8D3F-8147196B4670}"/>
+              </a:ext>
+            </a:extLst>
+          </p:cNvPr>
+          <p:cNvPicPr>
+            <a:picLocks noChangeAspect="1"/>
+          </p:cNvPicPr>
+          <p:nvPr/>
+        </p:nvPicPr>
+        <p:blipFill>
+          <a:blip r:embed="rId2"/>
+          <a:stretch>
+            <a:fillRect/>
+          </a:stretch>
+        </p:blipFill>
+        <p:spPr>
+          <a:xfrm>
+            <a:off x="2274227" y="1931255"/>
+            <a:ext cx="7643545" cy="3575693"/>
+          </a:xfrm>
+          <a:prstGeom prst="rect">
+            <a:avLst/>
+          </a:prstGeom>
+        </p:spPr>
+      </p:pic>
     </p:spTree>
     <p:extLst>
       <p:ext uri="{BB962C8B-B14F-4D97-AF65-F5344CB8AC3E}">
@@ -6413,7 +6426,7 @@
           <a:p>
             <a:r>
               <a:rPr lang="en-US" dirty="0"/>
-              <a:t>Part #3 – unemployment Rates vs. Median House Price</a:t>
+              <a:t>Part #3 – unemployment Rates vs. Median House Price - California</a:t>
             </a:r>
           </a:p>
         </p:txBody>
@@ -6432,8 +6445,8 @@
         </p:nvSpPr>
         <p:spPr>
           <a:xfrm>
-            <a:off x="448640" y="2106202"/>
-            <a:ext cx="11162169" cy="2585323"/>
+            <a:off x="514915" y="4609236"/>
+            <a:ext cx="11162169" cy="2031325"/>
           </a:xfrm>
           <a:prstGeom prst="rect">
             <a:avLst/>
@@ -6449,47 +6462,16 @@
             <a:endParaRPr lang="en-US" dirty="0"/>
           </a:p>
           <a:p>
+            <a:endParaRPr lang="en-US" dirty="0"/>
+          </a:p>
+          <a:p>
             <a:pPr marL="285750" indent="-285750">
               <a:buFont typeface="Arial" panose="020B0604020202020204" pitchFamily="34" charset="0"/>
               <a:buChar char="•"/>
             </a:pPr>
             <a:r>
               <a:rPr lang="en-US" dirty="0"/>
-              <a:t>Insert FIG of  “House Price By Year for California”</a:t>
-            </a:r>
-          </a:p>
-          <a:p>
-            <a:pPr marL="285750" indent="-285750">
-              <a:buFont typeface="Arial" panose="020B0604020202020204" pitchFamily="34" charset="0"/>
-              <a:buChar char="•"/>
-            </a:pPr>
-            <a:r>
-              <a:rPr lang="en-US" dirty="0"/>
-              <a:t>Insert FIG of “California scatter plot by year home price vs. unemployment”</a:t>
-            </a:r>
-          </a:p>
-          <a:p>
-            <a:pPr marL="285750" indent="-285750">
-              <a:buFont typeface="Arial" panose="020B0604020202020204" pitchFamily="34" charset="0"/>
-              <a:buChar char="•"/>
-            </a:pPr>
-            <a:endParaRPr lang="en-US" dirty="0"/>
-          </a:p>
-          <a:p>
-            <a:pPr marL="285750" indent="-285750">
-              <a:buFont typeface="Arial" panose="020B0604020202020204" pitchFamily="34" charset="0"/>
-              <a:buChar char="•"/>
-            </a:pPr>
-            <a:endParaRPr lang="en-US" dirty="0"/>
-          </a:p>
-          <a:p>
-            <a:pPr marL="285750" indent="-285750">
-              <a:buFont typeface="Arial" panose="020B0604020202020204" pitchFamily="34" charset="0"/>
-              <a:buChar char="•"/>
-            </a:pPr>
-            <a:r>
-              <a:rPr lang="en-US" dirty="0"/>
-              <a:t>Conclusions</a:t>
+              <a:t>Findings</a:t>
             </a:r>
           </a:p>
           <a:p>
@@ -6499,7 +6481,7 @@
             </a:pPr>
             <a:r>
               <a:rPr lang="en-US" dirty="0"/>
-              <a:t>Prices started high while unemployment rate was low, then recession hit and prices dropped while unemployment rates increased, then prices increased as unemployment rates returned to pre-recession levels</a:t>
+              <a:t>Small bullets on chart represent earlier years, get larger as time/years pass</a:t>
             </a:r>
           </a:p>
           <a:p>
@@ -6507,10 +6489,80 @@
               <a:buFont typeface="Arial" panose="020B0604020202020204" pitchFamily="34" charset="0"/>
               <a:buChar char="•"/>
             </a:pPr>
-            <a:endParaRPr lang="en-US" dirty="0"/>
-          </a:p>
-        </p:txBody>
-      </p:sp>
+            <a:r>
+              <a:rPr lang="en-US" dirty="0"/>
+              <a:t>Home Prices decreased in California as unemployment rose, and increased as unemployment decreased back to pre-recession levels</a:t>
+            </a:r>
+          </a:p>
+          <a:p>
+            <a:pPr marL="742950" lvl="1" indent="-285750">
+              <a:buFont typeface="Arial" panose="020B0604020202020204" pitchFamily="34" charset="0"/>
+              <a:buChar char="•"/>
+            </a:pPr>
+            <a:endParaRPr lang="en-US" dirty="0"/>
+          </a:p>
+        </p:txBody>
+      </p:sp>
+      <p:pic>
+        <p:nvPicPr>
+          <p:cNvPr id="3" name="Picture 2">
+            <a:extLst>
+              <a:ext uri="{FF2B5EF4-FFF2-40B4-BE49-F238E27FC236}">
+                <a16:creationId xmlns:a16="http://schemas.microsoft.com/office/drawing/2014/main" id="{734F1AAA-0DC9-4C1D-BB01-24318A1180DD}"/>
+              </a:ext>
+            </a:extLst>
+          </p:cNvPr>
+          <p:cNvPicPr>
+            <a:picLocks noChangeAspect="1"/>
+          </p:cNvPicPr>
+          <p:nvPr/>
+        </p:nvPicPr>
+        <p:blipFill>
+          <a:blip r:embed="rId2"/>
+          <a:stretch>
+            <a:fillRect/>
+          </a:stretch>
+        </p:blipFill>
+        <p:spPr>
+          <a:xfrm>
+            <a:off x="6227545" y="1887876"/>
+            <a:ext cx="5449539" cy="3082247"/>
+          </a:xfrm>
+          <a:prstGeom prst="rect">
+            <a:avLst/>
+          </a:prstGeom>
+        </p:spPr>
+      </p:pic>
+      <p:pic>
+        <p:nvPicPr>
+          <p:cNvPr id="4" name="Picture 3">
+            <a:extLst>
+              <a:ext uri="{FF2B5EF4-FFF2-40B4-BE49-F238E27FC236}">
+                <a16:creationId xmlns:a16="http://schemas.microsoft.com/office/drawing/2014/main" id="{C195AA96-BD01-4F82-AEA9-B53E6543AAE4}"/>
+              </a:ext>
+            </a:extLst>
+          </p:cNvPr>
+          <p:cNvPicPr>
+            <a:picLocks noChangeAspect="1"/>
+          </p:cNvPicPr>
+          <p:nvPr/>
+        </p:nvPicPr>
+        <p:blipFill>
+          <a:blip r:embed="rId3"/>
+          <a:stretch>
+            <a:fillRect/>
+          </a:stretch>
+        </p:blipFill>
+        <p:spPr>
+          <a:xfrm>
+            <a:off x="581192" y="1887876"/>
+            <a:ext cx="5383264" cy="3082247"/>
+          </a:xfrm>
+          <a:prstGeom prst="rect">
+            <a:avLst/>
+          </a:prstGeom>
+        </p:spPr>
+      </p:pic>
     </p:spTree>
     <p:extLst>
       <p:ext uri="{BB962C8B-B14F-4D97-AF65-F5344CB8AC3E}">
@@ -6564,7 +6616,7 @@
           <a:p>
             <a:r>
               <a:rPr lang="en-US" dirty="0"/>
-              <a:t>Part #3 – unemployment Rates vs. Median House Price</a:t>
+              <a:t>Part #3 – unemployment Rates vs. Median House Price – Rhode Island</a:t>
             </a:r>
           </a:p>
         </p:txBody>
@@ -6583,8 +6635,8 @@
         </p:nvSpPr>
         <p:spPr>
           <a:xfrm>
-            <a:off x="448640" y="2106202"/>
-            <a:ext cx="11162169" cy="2308324"/>
+            <a:off x="581193" y="4865786"/>
+            <a:ext cx="11162169" cy="1754326"/>
           </a:xfrm>
           <a:prstGeom prst="rect">
             <a:avLst/>
@@ -6600,40 +6652,16 @@
             <a:endParaRPr lang="en-US" dirty="0"/>
           </a:p>
           <a:p>
+            <a:endParaRPr lang="en-US" dirty="0"/>
+          </a:p>
+          <a:p>
             <a:pPr marL="285750" indent="-285750">
               <a:buFont typeface="Arial" panose="020B0604020202020204" pitchFamily="34" charset="0"/>
               <a:buChar char="•"/>
             </a:pPr>
             <a:r>
               <a:rPr lang="en-US" dirty="0"/>
-              <a:t>Insert FIG of  “Rhode Island Scatter Plot by year home price vs. unemployment”</a:t>
-            </a:r>
-          </a:p>
-          <a:p>
-            <a:pPr marL="285750" indent="-285750">
-              <a:buFont typeface="Arial" panose="020B0604020202020204" pitchFamily="34" charset="0"/>
-              <a:buChar char="•"/>
-            </a:pPr>
-            <a:r>
-              <a:rPr lang="en-US" dirty="0"/>
-              <a:t>Insert Fig of “House Price by Year for Rhode Island”</a:t>
-            </a:r>
-          </a:p>
-          <a:p>
-            <a:pPr marL="285750" indent="-285750">
-              <a:buFont typeface="Arial" panose="020B0604020202020204" pitchFamily="34" charset="0"/>
-              <a:buChar char="•"/>
-            </a:pPr>
-            <a:endParaRPr lang="en-US" dirty="0"/>
-          </a:p>
-          <a:p>
-            <a:pPr marL="285750" indent="-285750">
-              <a:buFont typeface="Arial" panose="020B0604020202020204" pitchFamily="34" charset="0"/>
-              <a:buChar char="•"/>
-            </a:pPr>
-            <a:r>
-              <a:rPr lang="en-US" dirty="0"/>
-              <a:t>Conclusions</a:t>
+              <a:t>Findings</a:t>
             </a:r>
           </a:p>
           <a:p>
@@ -6643,18 +6671,75 @@
             </a:pPr>
             <a:r>
               <a:rPr lang="en-US" dirty="0"/>
-              <a:t>Prices started high while unemployment rate was low, then recession hit and prices dropped while unemployment rates increased, then prices increased as unemployment rates returned to pre-recession levels</a:t>
-            </a:r>
-          </a:p>
-          <a:p>
-            <a:pPr marL="742950" lvl="1" indent="-285750">
-              <a:buFont typeface="Arial" panose="020B0604020202020204" pitchFamily="34" charset="0"/>
-              <a:buChar char="•"/>
-            </a:pPr>
-            <a:endParaRPr lang="en-US" dirty="0"/>
-          </a:p>
-        </p:txBody>
-      </p:sp>
+              <a:t>Similar findings to California, prices still have not returned to pre-recession levels here even though unemployment rates have returned to normal</a:t>
+            </a:r>
+          </a:p>
+          <a:p>
+            <a:pPr lvl="1"/>
+            <a:endParaRPr lang="en-US" dirty="0"/>
+          </a:p>
+        </p:txBody>
+      </p:sp>
+      <p:pic>
+        <p:nvPicPr>
+          <p:cNvPr id="3" name="Picture 2">
+            <a:extLst>
+              <a:ext uri="{FF2B5EF4-FFF2-40B4-BE49-F238E27FC236}">
+                <a16:creationId xmlns:a16="http://schemas.microsoft.com/office/drawing/2014/main" id="{8BC7D959-3E81-4752-BE9A-CE1BCCD22175}"/>
+              </a:ext>
+            </a:extLst>
+          </p:cNvPr>
+          <p:cNvPicPr>
+            <a:picLocks noChangeAspect="1"/>
+          </p:cNvPicPr>
+          <p:nvPr/>
+        </p:nvPicPr>
+        <p:blipFill>
+          <a:blip r:embed="rId2"/>
+          <a:stretch>
+            <a:fillRect/>
+          </a:stretch>
+        </p:blipFill>
+        <p:spPr>
+          <a:xfrm>
+            <a:off x="490889" y="2056545"/>
+            <a:ext cx="5389317" cy="3154059"/>
+          </a:xfrm>
+          <a:prstGeom prst="rect">
+            <a:avLst/>
+          </a:prstGeom>
+        </p:spPr>
+      </p:pic>
+      <p:pic>
+        <p:nvPicPr>
+          <p:cNvPr id="7" name="Picture 6">
+            <a:extLst>
+              <a:ext uri="{FF2B5EF4-FFF2-40B4-BE49-F238E27FC236}">
+                <a16:creationId xmlns:a16="http://schemas.microsoft.com/office/drawing/2014/main" id="{D81D7B0F-5831-400B-A9B8-3A77FD81B16E}"/>
+              </a:ext>
+            </a:extLst>
+          </p:cNvPr>
+          <p:cNvPicPr>
+            <a:picLocks noChangeAspect="1"/>
+          </p:cNvPicPr>
+          <p:nvPr/>
+        </p:nvPicPr>
+        <p:blipFill>
+          <a:blip r:embed="rId3"/>
+          <a:stretch>
+            <a:fillRect/>
+          </a:stretch>
+        </p:blipFill>
+        <p:spPr>
+          <a:xfrm>
+            <a:off x="6311796" y="2016779"/>
+            <a:ext cx="5521869" cy="3193825"/>
+          </a:xfrm>
+          <a:prstGeom prst="rect">
+            <a:avLst/>
+          </a:prstGeom>
+        </p:spPr>
+      </p:pic>
     </p:spTree>
     <p:extLst>
       <p:ext uri="{BB962C8B-B14F-4D97-AF65-F5344CB8AC3E}">
@@ -6727,8 +6812,8 @@
         </p:nvSpPr>
         <p:spPr>
           <a:xfrm>
-            <a:off x="448640" y="2106202"/>
-            <a:ext cx="11162169" cy="3416320"/>
+            <a:off x="7407705" y="1560496"/>
+            <a:ext cx="4507429" cy="2862322"/>
           </a:xfrm>
           <a:prstGeom prst="rect">
             <a:avLst/>
@@ -6744,40 +6829,16 @@
             <a:endParaRPr lang="en-US" dirty="0"/>
           </a:p>
           <a:p>
+            <a:endParaRPr lang="en-US" dirty="0"/>
+          </a:p>
+          <a:p>
             <a:pPr marL="285750" indent="-285750">
               <a:buFont typeface="Arial" panose="020B0604020202020204" pitchFamily="34" charset="0"/>
               <a:buChar char="•"/>
             </a:pPr>
             <a:r>
               <a:rPr lang="en-US" dirty="0"/>
-              <a:t>Insert Figs for Birth Rate Region 1</a:t>
-            </a:r>
-          </a:p>
-          <a:p>
-            <a:pPr marL="285750" indent="-285750">
-              <a:buFont typeface="Arial" panose="020B0604020202020204" pitchFamily="34" charset="0"/>
-              <a:buChar char="•"/>
-            </a:pPr>
-            <a:r>
-              <a:rPr lang="en-US" dirty="0"/>
-              <a:t>Insert Figs for Unemployment Rate Region 1</a:t>
-            </a:r>
-          </a:p>
-          <a:p>
-            <a:pPr marL="285750" indent="-285750">
-              <a:buFont typeface="Arial" panose="020B0604020202020204" pitchFamily="34" charset="0"/>
-              <a:buChar char="•"/>
-            </a:pPr>
-            <a:endParaRPr lang="en-US" dirty="0"/>
-          </a:p>
-          <a:p>
-            <a:pPr marL="285750" indent="-285750">
-              <a:buFont typeface="Arial" panose="020B0604020202020204" pitchFamily="34" charset="0"/>
-              <a:buChar char="•"/>
-            </a:pPr>
-            <a:r>
-              <a:rPr lang="en-US" dirty="0"/>
-              <a:t>Conclusions</a:t>
+              <a:t>Findings</a:t>
             </a:r>
           </a:p>
           <a:p>
@@ -6787,7 +6848,7 @@
             </a:pPr>
             <a:r>
               <a:rPr lang="en-US" dirty="0"/>
-              <a:t>Birth Rate at a 30 year low</a:t>
+              <a:t>Broke out birth rates into 10 regions</a:t>
             </a:r>
           </a:p>
           <a:p>
@@ -6797,15 +6858,7 @@
             </a:pPr>
             <a:r>
               <a:rPr lang="en-US" dirty="0"/>
-              <a:t>Utah has the lowest median age and majority of the population belongs to The Church of Jesus Christ of Latter-day Saints (Mormons). VT, NH, RI, CT and </a:t>
-            </a:r>
-            <a:r>
-              <a:rPr lang="en-US" dirty="0" err="1"/>
-              <a:t>Massachusets</a:t>
-            </a:r>
-            <a:r>
-              <a:rPr lang="en-US" dirty="0"/>
-              <a:t> have majors metropolitan areas and majors Ivy league Universities. All except RI are among 10 the most educated states in US. Woman who pursue higher education and focused on career are less likely to have kids or large families. These states are also have high median age, older women are less likely to have kids.</a:t>
+              <a:t>Graph here shows region with lowest birth rates</a:t>
             </a:r>
           </a:p>
           <a:p>
@@ -6813,10 +6866,80 @@
               <a:buFont typeface="Arial" panose="020B0604020202020204" pitchFamily="34" charset="0"/>
               <a:buChar char="•"/>
             </a:pPr>
-            <a:endParaRPr lang="en-US" dirty="0"/>
-          </a:p>
-        </p:txBody>
-      </p:sp>
+            <a:r>
+              <a:rPr lang="en-US" dirty="0"/>
+              <a:t>Expected to see birth rate increase as unemployment rates decreased, but that is not the case here</a:t>
+            </a:r>
+          </a:p>
+          <a:p>
+            <a:pPr marL="742950" lvl="1" indent="-285750">
+              <a:buFont typeface="Arial" panose="020B0604020202020204" pitchFamily="34" charset="0"/>
+              <a:buChar char="•"/>
+            </a:pPr>
+            <a:endParaRPr lang="en-US" dirty="0"/>
+          </a:p>
+        </p:txBody>
+      </p:sp>
+      <p:pic>
+        <p:nvPicPr>
+          <p:cNvPr id="3" name="Picture 2">
+            <a:extLst>
+              <a:ext uri="{FF2B5EF4-FFF2-40B4-BE49-F238E27FC236}">
+                <a16:creationId xmlns:a16="http://schemas.microsoft.com/office/drawing/2014/main" id="{47397A8E-49BA-431F-917C-AE2B50805432}"/>
+              </a:ext>
+            </a:extLst>
+          </p:cNvPr>
+          <p:cNvPicPr>
+            <a:picLocks noChangeAspect="1"/>
+          </p:cNvPicPr>
+          <p:nvPr/>
+        </p:nvPicPr>
+        <p:blipFill>
+          <a:blip r:embed="rId2"/>
+          <a:stretch>
+            <a:fillRect/>
+          </a:stretch>
+        </p:blipFill>
+        <p:spPr>
+          <a:xfrm>
+            <a:off x="319002" y="1866601"/>
+            <a:ext cx="7063255" cy="2450298"/>
+          </a:xfrm>
+          <a:prstGeom prst="rect">
+            <a:avLst/>
+          </a:prstGeom>
+        </p:spPr>
+      </p:pic>
+      <p:pic>
+        <p:nvPicPr>
+          <p:cNvPr id="4" name="Picture 3">
+            <a:extLst>
+              <a:ext uri="{FF2B5EF4-FFF2-40B4-BE49-F238E27FC236}">
+                <a16:creationId xmlns:a16="http://schemas.microsoft.com/office/drawing/2014/main" id="{BFF85ADD-8C07-4263-89FE-5B1633B6FDB9}"/>
+              </a:ext>
+            </a:extLst>
+          </p:cNvPr>
+          <p:cNvPicPr>
+            <a:picLocks noChangeAspect="1"/>
+          </p:cNvPicPr>
+          <p:nvPr/>
+        </p:nvPicPr>
+        <p:blipFill>
+          <a:blip r:embed="rId3"/>
+          <a:stretch>
+            <a:fillRect/>
+          </a:stretch>
+        </p:blipFill>
+        <p:spPr>
+          <a:xfrm>
+            <a:off x="319002" y="4238152"/>
+            <a:ext cx="7088703" cy="2267021"/>
+          </a:xfrm>
+          <a:prstGeom prst="rect">
+            <a:avLst/>
+          </a:prstGeom>
+        </p:spPr>
+      </p:pic>
     </p:spTree>
     <p:extLst>
       <p:ext uri="{BB962C8B-B14F-4D97-AF65-F5344CB8AC3E}">
@@ -6889,8 +7012,8 @@
         </p:nvSpPr>
         <p:spPr>
           <a:xfrm>
-            <a:off x="448640" y="2106202"/>
-            <a:ext cx="11162169" cy="3416320"/>
+            <a:off x="7392200" y="1422276"/>
+            <a:ext cx="4468231" cy="3139321"/>
           </a:xfrm>
           <a:prstGeom prst="rect">
             <a:avLst/>
@@ -6906,40 +7029,16 @@
             <a:endParaRPr lang="en-US" dirty="0"/>
           </a:p>
           <a:p>
+            <a:endParaRPr lang="en-US" dirty="0"/>
+          </a:p>
+          <a:p>
             <a:pPr marL="285750" indent="-285750">
               <a:buFont typeface="Arial" panose="020B0604020202020204" pitchFamily="34" charset="0"/>
               <a:buChar char="•"/>
             </a:pPr>
             <a:r>
               <a:rPr lang="en-US" dirty="0"/>
-              <a:t>Insert Figs for Birth Rate region 8</a:t>
-            </a:r>
-          </a:p>
-          <a:p>
-            <a:pPr marL="285750" indent="-285750">
-              <a:buFont typeface="Arial" panose="020B0604020202020204" pitchFamily="34" charset="0"/>
-              <a:buChar char="•"/>
-            </a:pPr>
-            <a:r>
-              <a:rPr lang="en-US" dirty="0"/>
-              <a:t>Insert Figs for Unemployment Rate region 8</a:t>
-            </a:r>
-          </a:p>
-          <a:p>
-            <a:pPr marL="285750" indent="-285750">
-              <a:buFont typeface="Arial" panose="020B0604020202020204" pitchFamily="34" charset="0"/>
-              <a:buChar char="•"/>
-            </a:pPr>
-            <a:endParaRPr lang="en-US" dirty="0"/>
-          </a:p>
-          <a:p>
-            <a:pPr marL="285750" indent="-285750">
-              <a:buFont typeface="Arial" panose="020B0604020202020204" pitchFamily="34" charset="0"/>
-              <a:buChar char="•"/>
-            </a:pPr>
-            <a:r>
-              <a:rPr lang="en-US" dirty="0"/>
-              <a:t>Conclusions</a:t>
+              <a:t>Findings</a:t>
             </a:r>
           </a:p>
           <a:p>
@@ -6949,7 +7048,7 @@
             </a:pPr>
             <a:r>
               <a:rPr lang="en-US" dirty="0"/>
-              <a:t>Birth Rate at a 30 year low</a:t>
+              <a:t>Graph here shows region with highest birth rates</a:t>
             </a:r>
           </a:p>
           <a:p>
@@ -6959,15 +7058,7 @@
             </a:pPr>
             <a:r>
               <a:rPr lang="en-US" dirty="0"/>
-              <a:t>Utah has the lowest median age and majority of the population belongs to The Church of Jesus Christ of Latter-day Saints (Mormons). VT, NH, RI, CT and </a:t>
-            </a:r>
-            <a:r>
-              <a:rPr lang="en-US" dirty="0" err="1"/>
-              <a:t>Massachusets</a:t>
-            </a:r>
-            <a:r>
-              <a:rPr lang="en-US" dirty="0"/>
-              <a:t> have majors metropolitan areas and majors Ivy league Universities. All except RI are among 10 the most educated states in US. Woman who pursue higher education and focused on career are less likely to have kids or large families. These states are also have high median age, older women are less likely to have kids.</a:t>
+              <a:t>Again, expected to see birth rate increase as unemployment rates decreased, but that is not the case</a:t>
             </a:r>
           </a:p>
           <a:p>
@@ -6975,10 +7066,73 @@
               <a:buFont typeface="Arial" panose="020B0604020202020204" pitchFamily="34" charset="0"/>
               <a:buChar char="•"/>
             </a:pPr>
-            <a:endParaRPr lang="en-US" dirty="0"/>
-          </a:p>
-        </p:txBody>
-      </p:sp>
+            <a:r>
+              <a:rPr lang="en-US" dirty="0"/>
+              <a:t>Can conclude that birth rate and unemployment rate do not have a correlation today</a:t>
+            </a:r>
+          </a:p>
+        </p:txBody>
+      </p:sp>
+      <p:pic>
+        <p:nvPicPr>
+          <p:cNvPr id="3" name="Picture 2">
+            <a:extLst>
+              <a:ext uri="{FF2B5EF4-FFF2-40B4-BE49-F238E27FC236}">
+                <a16:creationId xmlns:a16="http://schemas.microsoft.com/office/drawing/2014/main" id="{D99F610B-C136-4F31-9983-6D437F90C9B5}"/>
+              </a:ext>
+            </a:extLst>
+          </p:cNvPr>
+          <p:cNvPicPr>
+            <a:picLocks noChangeAspect="1"/>
+          </p:cNvPicPr>
+          <p:nvPr/>
+        </p:nvPicPr>
+        <p:blipFill>
+          <a:blip r:embed="rId2"/>
+          <a:stretch>
+            <a:fillRect/>
+          </a:stretch>
+        </p:blipFill>
+        <p:spPr>
+          <a:xfrm>
+            <a:off x="331568" y="1944303"/>
+            <a:ext cx="6800752" cy="2155629"/>
+          </a:xfrm>
+          <a:prstGeom prst="rect">
+            <a:avLst/>
+          </a:prstGeom>
+        </p:spPr>
+      </p:pic>
+      <p:pic>
+        <p:nvPicPr>
+          <p:cNvPr id="4" name="Picture 3">
+            <a:extLst>
+              <a:ext uri="{FF2B5EF4-FFF2-40B4-BE49-F238E27FC236}">
+                <a16:creationId xmlns:a16="http://schemas.microsoft.com/office/drawing/2014/main" id="{66058984-E427-4655-9666-B38CA53EFF20}"/>
+              </a:ext>
+            </a:extLst>
+          </p:cNvPr>
+          <p:cNvPicPr>
+            <a:picLocks noChangeAspect="1"/>
+          </p:cNvPicPr>
+          <p:nvPr/>
+        </p:nvPicPr>
+        <p:blipFill>
+          <a:blip r:embed="rId3"/>
+          <a:stretch>
+            <a:fillRect/>
+          </a:stretch>
+        </p:blipFill>
+        <p:spPr>
+          <a:xfrm>
+            <a:off x="331569" y="4167738"/>
+            <a:ext cx="6800752" cy="2428345"/>
+          </a:xfrm>
+          <a:prstGeom prst="rect">
+            <a:avLst/>
+          </a:prstGeom>
+        </p:spPr>
+      </p:pic>
     </p:spTree>
     <p:extLst>
       <p:ext uri="{BB962C8B-B14F-4D97-AF65-F5344CB8AC3E}">
@@ -7861,6 +8015,15 @@
 </file>
 
 <file path=customXml/item2.xml><?xml version="1.0" encoding="utf-8"?>
+<?mso-contentType ?>
+<FormTemplates xmlns="http://schemas.microsoft.com/sharepoint/v3/contenttype/forms">
+  <Display>DocumentLibraryForm</Display>
+  <Edit>DocumentLibraryForm</Edit>
+  <New>DocumentLibraryForm</New>
+</FormTemplates>
+</file>
+
+<file path=customXml/item3.xml><?xml version="1.0" encoding="utf-8"?>
 <ct:contentTypeSchema xmlns:ct="http://schemas.microsoft.com/office/2006/metadata/contentType" xmlns:ma="http://schemas.microsoft.com/office/2006/metadata/properties/metaAttributes" ct:_="" ma:_="" ma:contentTypeName="Document" ma:contentTypeID="0x01010079F111ED35F8CC479449609E8A0923A6" ma:contentTypeVersion="12" ma:contentTypeDescription="Create a new document." ma:contentTypeScope="" ma:versionID="b385d60f68dd989dca1fdc827799d853">
   <xsd:schema xmlns:xsd="http://www.w3.org/2001/XMLSchema" xmlns:xs="http://www.w3.org/2001/XMLSchema" xmlns:p="http://schemas.microsoft.com/office/2006/metadata/properties" xmlns:ns2="71af3243-3dd4-4a8d-8c0d-dd76da1f02a5" xmlns:ns3="16c05727-aa75-4e4a-9b5f-8a80a1165891" targetNamespace="http://schemas.microsoft.com/office/2006/metadata/properties" ma:root="true" ma:fieldsID="1911b479caf7b199da365455750e4572" ns2:_="" ns3:_="">
     <xsd:import namespace="71af3243-3dd4-4a8d-8c0d-dd76da1f02a5"/>
@@ -8081,15 +8244,6 @@
 </ct:contentTypeSchema>
 </file>
 
-<file path=customXml/item3.xml><?xml version="1.0" encoding="utf-8"?>
-<?mso-contentType ?>
-<FormTemplates xmlns="http://schemas.microsoft.com/sharepoint/v3/contenttype/forms">
-  <Display>DocumentLibraryForm</Display>
-  <Edit>DocumentLibraryForm</Edit>
-  <New>DocumentLibraryForm</New>
-</FormTemplates>
-</file>
-
 <file path=customXml/itemProps1.xml><?xml version="1.0" encoding="utf-8"?>
 <ds:datastoreItem xmlns:ds="http://schemas.openxmlformats.org/officeDocument/2006/customXml" ds:itemID="{FF5C8BF1-B0E4-49A1-808F-40F2AD30E743}">
   <ds:schemaRefs>
@@ -8101,6 +8255,14 @@
 </file>
 
 <file path=customXml/itemProps2.xml><?xml version="1.0" encoding="utf-8"?>
+<ds:datastoreItem xmlns:ds="http://schemas.openxmlformats.org/officeDocument/2006/customXml" ds:itemID="{E3FC8A1C-A436-42C0-AC33-FAFFFAF219BC}">
+  <ds:schemaRefs>
+    <ds:schemaRef ds:uri="http://schemas.microsoft.com/sharepoint/v3/contenttype/forms"/>
+  </ds:schemaRefs>
+</ds:datastoreItem>
+</file>
+
+<file path=customXml/itemProps3.xml><?xml version="1.0" encoding="utf-8"?>
 <ds:datastoreItem xmlns:ds="http://schemas.openxmlformats.org/officeDocument/2006/customXml" ds:itemID="{E3852F5D-AAE7-473B-9767-8875B60BC63B}">
   <ds:schemaRefs>
     <ds:schemaRef ds:uri="http://schemas.microsoft.com/office/2006/metadata/contentType"/>
@@ -8117,12 +8279,4 @@
     <ds:schemaRef ds:uri="http://schemas.microsoft.com/internal/obd"/>
   </ds:schemaRefs>
 </ds:datastoreItem>
-</file>
-
-<file path=customXml/itemProps3.xml><?xml version="1.0" encoding="utf-8"?>
-<ds:datastoreItem xmlns:ds="http://schemas.openxmlformats.org/officeDocument/2006/customXml" ds:itemID="{E3FC8A1C-A436-42C0-AC33-FAFFFAF219BC}">
-  <ds:schemaRefs>
-    <ds:schemaRef ds:uri="http://schemas.microsoft.com/sharepoint/v3/contenttype/forms"/>
-  </ds:schemaRefs>
-</ds:datastoreItem>
 </file>
</xml_diff>